<commit_message>
Adding results Adding comments New binaries
</commit_message>
<xml_diff>
--- a/Docs/Presentation finale.pptx
+++ b/Docs/Presentation finale.pptx
@@ -15,10 +15,13 @@
     <p:sldId id="270" r:id="rId9"/>
     <p:sldId id="259" r:id="rId10"/>
     <p:sldId id="266" r:id="rId11"/>
-    <p:sldId id="261" r:id="rId12"/>
-    <p:sldId id="268" r:id="rId13"/>
-    <p:sldId id="262" r:id="rId14"/>
-    <p:sldId id="267" r:id="rId15"/>
+    <p:sldId id="272" r:id="rId12"/>
+    <p:sldId id="273" r:id="rId13"/>
+    <p:sldId id="277" r:id="rId14"/>
+    <p:sldId id="261" r:id="rId15"/>
+    <p:sldId id="268" r:id="rId16"/>
+    <p:sldId id="262" r:id="rId17"/>
+    <p:sldId id="267" r:id="rId18"/>
   </p:sldIdLst>
   <p:sldSz cx="9144000" cy="6858000" type="screen4x3"/>
   <p:notesSz cx="6858000" cy="9144000"/>
@@ -120,6 +123,585 @@
 </p:presentation>
 </file>
 
+<file path=ppt/charts/chart1.xml><?xml version="1.0" encoding="utf-8"?>
+<c:chartSpace xmlns:c="http://schemas.openxmlformats.org/drawingml/2006/chart" xmlns:a="http://schemas.openxmlformats.org/drawingml/2006/main" xmlns:r="http://schemas.openxmlformats.org/officeDocument/2006/relationships">
+  <c:lang val="fr-CA"/>
+  <c:chart>
+    <c:plotArea>
+      <c:layout/>
+      <c:lineChart>
+        <c:grouping val="standard"/>
+        <c:ser>
+          <c:idx val="0"/>
+          <c:order val="0"/>
+          <c:tx>
+            <c:strRef>
+              <c:f>Feuil1!$B$1</c:f>
+              <c:strCache>
+                <c:ptCount val="1"/>
+                <c:pt idx="0">
+                  <c:v>MyCommander</c:v>
+                </c:pt>
+              </c:strCache>
+            </c:strRef>
+          </c:tx>
+          <c:marker>
+            <c:symbol val="none"/>
+          </c:marker>
+          <c:val>
+            <c:numRef>
+              <c:f>Feuil1!$B$2:$B$16</c:f>
+              <c:numCache>
+                <c:formatCode>General</c:formatCode>
+                <c:ptCount val="15"/>
+                <c:pt idx="0">
+                  <c:v>1</c:v>
+                </c:pt>
+                <c:pt idx="1">
+                  <c:v>1</c:v>
+                </c:pt>
+                <c:pt idx="2">
+                  <c:v>0</c:v>
+                </c:pt>
+                <c:pt idx="3">
+                  <c:v>2</c:v>
+                </c:pt>
+                <c:pt idx="4">
+                  <c:v>1</c:v>
+                </c:pt>
+                <c:pt idx="5">
+                  <c:v>1</c:v>
+                </c:pt>
+                <c:pt idx="6">
+                  <c:v>0</c:v>
+                </c:pt>
+                <c:pt idx="7">
+                  <c:v>1</c:v>
+                </c:pt>
+                <c:pt idx="8">
+                  <c:v>2</c:v>
+                </c:pt>
+                <c:pt idx="9">
+                  <c:v>3</c:v>
+                </c:pt>
+                <c:pt idx="10">
+                  <c:v>1</c:v>
+                </c:pt>
+                <c:pt idx="11">
+                  <c:v>1</c:v>
+                </c:pt>
+                <c:pt idx="12">
+                  <c:v>1</c:v>
+                </c:pt>
+                <c:pt idx="13">
+                  <c:v>1</c:v>
+                </c:pt>
+                <c:pt idx="14">
+                  <c:v>0</c:v>
+                </c:pt>
+              </c:numCache>
+            </c:numRef>
+          </c:val>
+        </c:ser>
+        <c:ser>
+          <c:idx val="1"/>
+          <c:order val="1"/>
+          <c:tx>
+            <c:strRef>
+              <c:f>Feuil1!$C$1</c:f>
+              <c:strCache>
+                <c:ptCount val="1"/>
+                <c:pt idx="0">
+                  <c:v>BalancedCommander</c:v>
+                </c:pt>
+              </c:strCache>
+            </c:strRef>
+          </c:tx>
+          <c:marker>
+            <c:symbol val="none"/>
+          </c:marker>
+          <c:val>
+            <c:numRef>
+              <c:f>Feuil1!$C$2:$C$16</c:f>
+              <c:numCache>
+                <c:formatCode>General</c:formatCode>
+                <c:ptCount val="15"/>
+                <c:pt idx="0">
+                  <c:v>1</c:v>
+                </c:pt>
+                <c:pt idx="1">
+                  <c:v>2</c:v>
+                </c:pt>
+                <c:pt idx="2">
+                  <c:v>1</c:v>
+                </c:pt>
+                <c:pt idx="3">
+                  <c:v>2</c:v>
+                </c:pt>
+                <c:pt idx="4">
+                  <c:v>0</c:v>
+                </c:pt>
+                <c:pt idx="5">
+                  <c:v>2</c:v>
+                </c:pt>
+                <c:pt idx="6">
+                  <c:v>0</c:v>
+                </c:pt>
+                <c:pt idx="7">
+                  <c:v>1</c:v>
+                </c:pt>
+                <c:pt idx="8">
+                  <c:v>1</c:v>
+                </c:pt>
+                <c:pt idx="9">
+                  <c:v>4</c:v>
+                </c:pt>
+                <c:pt idx="10">
+                  <c:v>1</c:v>
+                </c:pt>
+                <c:pt idx="11">
+                  <c:v>0</c:v>
+                </c:pt>
+                <c:pt idx="12">
+                  <c:v>2</c:v>
+                </c:pt>
+                <c:pt idx="13">
+                  <c:v>1</c:v>
+                </c:pt>
+                <c:pt idx="14">
+                  <c:v>4</c:v>
+                </c:pt>
+              </c:numCache>
+            </c:numRef>
+          </c:val>
+        </c:ser>
+        <c:marker val="1"/>
+        <c:axId val="101787520"/>
+        <c:axId val="101789056"/>
+      </c:lineChart>
+      <c:catAx>
+        <c:axId val="101787520"/>
+        <c:scaling>
+          <c:orientation val="minMax"/>
+        </c:scaling>
+        <c:axPos val="b"/>
+        <c:tickLblPos val="nextTo"/>
+        <c:crossAx val="101789056"/>
+        <c:crosses val="autoZero"/>
+        <c:auto val="1"/>
+        <c:lblAlgn val="ctr"/>
+        <c:lblOffset val="100"/>
+      </c:catAx>
+      <c:valAx>
+        <c:axId val="101789056"/>
+        <c:scaling>
+          <c:orientation val="minMax"/>
+        </c:scaling>
+        <c:axPos val="l"/>
+        <c:majorGridlines/>
+        <c:numFmt formatCode="General" sourceLinked="1"/>
+        <c:tickLblPos val="nextTo"/>
+        <c:crossAx val="101787520"/>
+        <c:crosses val="autoZero"/>
+        <c:crossBetween val="between"/>
+      </c:valAx>
+    </c:plotArea>
+    <c:legend>
+      <c:legendPos val="r"/>
+      <c:layout/>
+    </c:legend>
+    <c:plotVisOnly val="1"/>
+  </c:chart>
+  <c:externalData r:id="rId1"/>
+</c:chartSpace>
+</file>
+
+<file path=ppt/charts/chart2.xml><?xml version="1.0" encoding="utf-8"?>
+<c:chartSpace xmlns:c="http://schemas.openxmlformats.org/drawingml/2006/chart" xmlns:a="http://schemas.openxmlformats.org/drawingml/2006/main" xmlns:r="http://schemas.openxmlformats.org/officeDocument/2006/relationships">
+  <c:lang val="fr-CA"/>
+  <c:chart>
+    <c:plotArea>
+      <c:layout/>
+      <c:lineChart>
+        <c:grouping val="standard"/>
+        <c:ser>
+          <c:idx val="0"/>
+          <c:order val="0"/>
+          <c:tx>
+            <c:strRef>
+              <c:f>Feuil1!$B$17</c:f>
+              <c:strCache>
+                <c:ptCount val="1"/>
+                <c:pt idx="0">
+                  <c:v>MyCommander</c:v>
+                </c:pt>
+              </c:strCache>
+            </c:strRef>
+          </c:tx>
+          <c:marker>
+            <c:symbol val="none"/>
+          </c:marker>
+          <c:val>
+            <c:numRef>
+              <c:f>Feuil1!$B$18:$B$32</c:f>
+              <c:numCache>
+                <c:formatCode>General</c:formatCode>
+                <c:ptCount val="15"/>
+                <c:pt idx="0">
+                  <c:v>0</c:v>
+                </c:pt>
+                <c:pt idx="1">
+                  <c:v>0</c:v>
+                </c:pt>
+                <c:pt idx="2">
+                  <c:v>0</c:v>
+                </c:pt>
+                <c:pt idx="3">
+                  <c:v>0</c:v>
+                </c:pt>
+                <c:pt idx="4">
+                  <c:v>0</c:v>
+                </c:pt>
+                <c:pt idx="5">
+                  <c:v>1</c:v>
+                </c:pt>
+                <c:pt idx="6">
+                  <c:v>0</c:v>
+                </c:pt>
+                <c:pt idx="7">
+                  <c:v>0</c:v>
+                </c:pt>
+                <c:pt idx="8">
+                  <c:v>0</c:v>
+                </c:pt>
+                <c:pt idx="9">
+                  <c:v>0</c:v>
+                </c:pt>
+                <c:pt idx="10">
+                  <c:v>1</c:v>
+                </c:pt>
+                <c:pt idx="11">
+                  <c:v>1</c:v>
+                </c:pt>
+                <c:pt idx="12">
+                  <c:v>0</c:v>
+                </c:pt>
+                <c:pt idx="13">
+                  <c:v>0</c:v>
+                </c:pt>
+                <c:pt idx="14">
+                  <c:v>0</c:v>
+                </c:pt>
+              </c:numCache>
+            </c:numRef>
+          </c:val>
+        </c:ser>
+        <c:ser>
+          <c:idx val="1"/>
+          <c:order val="1"/>
+          <c:tx>
+            <c:strRef>
+              <c:f>Feuil1!$C$17</c:f>
+              <c:strCache>
+                <c:ptCount val="1"/>
+                <c:pt idx="0">
+                  <c:v>RandomCommander</c:v>
+                </c:pt>
+              </c:strCache>
+            </c:strRef>
+          </c:tx>
+          <c:marker>
+            <c:symbol val="none"/>
+          </c:marker>
+          <c:val>
+            <c:numRef>
+              <c:f>Feuil1!$C$18:$C$32</c:f>
+              <c:numCache>
+                <c:formatCode>General</c:formatCode>
+                <c:ptCount val="15"/>
+                <c:pt idx="0">
+                  <c:v>1</c:v>
+                </c:pt>
+                <c:pt idx="1">
+                  <c:v>0</c:v>
+                </c:pt>
+                <c:pt idx="2">
+                  <c:v>0</c:v>
+                </c:pt>
+                <c:pt idx="3">
+                  <c:v>3</c:v>
+                </c:pt>
+                <c:pt idx="4">
+                  <c:v>2</c:v>
+                </c:pt>
+                <c:pt idx="5">
+                  <c:v>0</c:v>
+                </c:pt>
+                <c:pt idx="6">
+                  <c:v>0</c:v>
+                </c:pt>
+                <c:pt idx="7">
+                  <c:v>1</c:v>
+                </c:pt>
+                <c:pt idx="8">
+                  <c:v>0</c:v>
+                </c:pt>
+                <c:pt idx="9">
+                  <c:v>1</c:v>
+                </c:pt>
+                <c:pt idx="10">
+                  <c:v>1</c:v>
+                </c:pt>
+                <c:pt idx="11">
+                  <c:v>0</c:v>
+                </c:pt>
+                <c:pt idx="12">
+                  <c:v>0</c:v>
+                </c:pt>
+                <c:pt idx="13">
+                  <c:v>2</c:v>
+                </c:pt>
+                <c:pt idx="14">
+                  <c:v>2</c:v>
+                </c:pt>
+              </c:numCache>
+            </c:numRef>
+          </c:val>
+        </c:ser>
+        <c:marker val="1"/>
+        <c:axId val="91420544"/>
+        <c:axId val="92879488"/>
+      </c:lineChart>
+      <c:catAx>
+        <c:axId val="91420544"/>
+        <c:scaling>
+          <c:orientation val="minMax"/>
+        </c:scaling>
+        <c:axPos val="b"/>
+        <c:tickLblPos val="nextTo"/>
+        <c:crossAx val="92879488"/>
+        <c:crosses val="autoZero"/>
+        <c:auto val="1"/>
+        <c:lblAlgn val="ctr"/>
+        <c:lblOffset val="100"/>
+      </c:catAx>
+      <c:valAx>
+        <c:axId val="92879488"/>
+        <c:scaling>
+          <c:orientation val="minMax"/>
+        </c:scaling>
+        <c:axPos val="l"/>
+        <c:majorGridlines/>
+        <c:numFmt formatCode="General" sourceLinked="1"/>
+        <c:tickLblPos val="nextTo"/>
+        <c:crossAx val="91420544"/>
+        <c:crosses val="autoZero"/>
+        <c:crossBetween val="between"/>
+      </c:valAx>
+    </c:plotArea>
+    <c:legend>
+      <c:legendPos val="r"/>
+      <c:layout/>
+    </c:legend>
+    <c:plotVisOnly val="1"/>
+  </c:chart>
+  <c:externalData r:id="rId1"/>
+</c:chartSpace>
+</file>
+
+<file path=ppt/charts/chart3.xml><?xml version="1.0" encoding="utf-8"?>
+<c:chartSpace xmlns:c="http://schemas.openxmlformats.org/drawingml/2006/chart" xmlns:a="http://schemas.openxmlformats.org/drawingml/2006/main" xmlns:r="http://schemas.openxmlformats.org/officeDocument/2006/relationships">
+  <c:lang val="fr-CA"/>
+  <c:chart>
+    <c:plotArea>
+      <c:layout/>
+      <c:lineChart>
+        <c:grouping val="standard"/>
+        <c:ser>
+          <c:idx val="0"/>
+          <c:order val="0"/>
+          <c:tx>
+            <c:strRef>
+              <c:f>Feuil1!$B$34</c:f>
+              <c:strCache>
+                <c:ptCount val="1"/>
+                <c:pt idx="0">
+                  <c:v>MyCommander</c:v>
+                </c:pt>
+              </c:strCache>
+            </c:strRef>
+          </c:tx>
+          <c:marker>
+            <c:symbol val="none"/>
+          </c:marker>
+          <c:val>
+            <c:numRef>
+              <c:f>Feuil1!$B$35:$B$49</c:f>
+              <c:numCache>
+                <c:formatCode>General</c:formatCode>
+                <c:ptCount val="15"/>
+                <c:pt idx="0">
+                  <c:v>1</c:v>
+                </c:pt>
+                <c:pt idx="1">
+                  <c:v>0</c:v>
+                </c:pt>
+                <c:pt idx="2">
+                  <c:v>0</c:v>
+                </c:pt>
+                <c:pt idx="3">
+                  <c:v>0</c:v>
+                </c:pt>
+                <c:pt idx="4">
+                  <c:v>0</c:v>
+                </c:pt>
+                <c:pt idx="5">
+                  <c:v>0</c:v>
+                </c:pt>
+                <c:pt idx="6">
+                  <c:v>0</c:v>
+                </c:pt>
+                <c:pt idx="7">
+                  <c:v>0</c:v>
+                </c:pt>
+                <c:pt idx="8">
+                  <c:v>0</c:v>
+                </c:pt>
+                <c:pt idx="9">
+                  <c:v>1</c:v>
+                </c:pt>
+                <c:pt idx="10">
+                  <c:v>0</c:v>
+                </c:pt>
+                <c:pt idx="11">
+                  <c:v>0</c:v>
+                </c:pt>
+                <c:pt idx="12">
+                  <c:v>1</c:v>
+                </c:pt>
+                <c:pt idx="13">
+                  <c:v>0</c:v>
+                </c:pt>
+                <c:pt idx="14">
+                  <c:v>0</c:v>
+                </c:pt>
+              </c:numCache>
+            </c:numRef>
+          </c:val>
+        </c:ser>
+        <c:ser>
+          <c:idx val="1"/>
+          <c:order val="1"/>
+          <c:tx>
+            <c:strRef>
+              <c:f>Feuil1!$C$34</c:f>
+              <c:strCache>
+                <c:ptCount val="1"/>
+                <c:pt idx="0">
+                  <c:v>Terminator</c:v>
+                </c:pt>
+              </c:strCache>
+            </c:strRef>
+          </c:tx>
+          <c:marker>
+            <c:symbol val="none"/>
+          </c:marker>
+          <c:val>
+            <c:numRef>
+              <c:f>Feuil1!$C$35:$C$49</c:f>
+              <c:numCache>
+                <c:formatCode>General</c:formatCode>
+                <c:ptCount val="15"/>
+                <c:pt idx="0">
+                  <c:v>2</c:v>
+                </c:pt>
+                <c:pt idx="1">
+                  <c:v>2</c:v>
+                </c:pt>
+                <c:pt idx="2">
+                  <c:v>1</c:v>
+                </c:pt>
+                <c:pt idx="3">
+                  <c:v>2</c:v>
+                </c:pt>
+                <c:pt idx="4">
+                  <c:v>1</c:v>
+                </c:pt>
+                <c:pt idx="5">
+                  <c:v>2</c:v>
+                </c:pt>
+                <c:pt idx="6">
+                  <c:v>3</c:v>
+                </c:pt>
+                <c:pt idx="7">
+                  <c:v>2</c:v>
+                </c:pt>
+                <c:pt idx="8">
+                  <c:v>2</c:v>
+                </c:pt>
+                <c:pt idx="9">
+                  <c:v>1</c:v>
+                </c:pt>
+                <c:pt idx="10">
+                  <c:v>3</c:v>
+                </c:pt>
+                <c:pt idx="11">
+                  <c:v>4</c:v>
+                </c:pt>
+                <c:pt idx="12">
+                  <c:v>3</c:v>
+                </c:pt>
+                <c:pt idx="13">
+                  <c:v>2</c:v>
+                </c:pt>
+                <c:pt idx="14">
+                  <c:v>2</c:v>
+                </c:pt>
+              </c:numCache>
+            </c:numRef>
+          </c:val>
+        </c:ser>
+        <c:marker val="1"/>
+        <c:axId val="88010112"/>
+        <c:axId val="88733184"/>
+      </c:lineChart>
+      <c:catAx>
+        <c:axId val="88010112"/>
+        <c:scaling>
+          <c:orientation val="minMax"/>
+        </c:scaling>
+        <c:axPos val="b"/>
+        <c:tickLblPos val="nextTo"/>
+        <c:crossAx val="88733184"/>
+        <c:crosses val="autoZero"/>
+        <c:auto val="1"/>
+        <c:lblAlgn val="ctr"/>
+        <c:lblOffset val="100"/>
+      </c:catAx>
+      <c:valAx>
+        <c:axId val="88733184"/>
+        <c:scaling>
+          <c:orientation val="minMax"/>
+        </c:scaling>
+        <c:axPos val="l"/>
+        <c:majorGridlines/>
+        <c:numFmt formatCode="General" sourceLinked="1"/>
+        <c:tickLblPos val="nextTo"/>
+        <c:crossAx val="88010112"/>
+        <c:crosses val="autoZero"/>
+        <c:crossBetween val="between"/>
+      </c:valAx>
+    </c:plotArea>
+    <c:legend>
+      <c:legendPos val="r"/>
+      <c:layout/>
+    </c:legend>
+    <c:plotVisOnly val="1"/>
+  </c:chart>
+  <c:externalData r:id="rId1"/>
+</c:chartSpace>
+</file>
+
 <file path=ppt/slideLayouts/slideLayout1.xml><?xml version="1.0" encoding="utf-8"?>
 <p:sldLayout xmlns:a="http://schemas.openxmlformats.org/drawingml/2006/main" xmlns:r="http://schemas.openxmlformats.org/officeDocument/2006/relationships" xmlns:p="http://schemas.openxmlformats.org/presentationml/2006/main" showMasterSp="0" type="title" preserve="1">
   <p:cSld name="Diapositive de titre">
@@ -264,7 +846,7 @@
             <a:fld id="{AA309A6D-C09C-4548-B29A-6CF363A7E532}" type="datetimeFigureOut">
               <a:rPr lang="fr-FR" smtClean="0"/>
               <a:pPr/>
-              <a:t>09/04/2013</a:t>
+              <a:t>11/04/2013</a:t>
             </a:fld>
             <a:endParaRPr lang="fr-BE"/>
           </a:p>
@@ -625,7 +1207,7 @@
             <a:fld id="{AA309A6D-C09C-4548-B29A-6CF363A7E532}" type="datetimeFigureOut">
               <a:rPr lang="fr-FR" smtClean="0"/>
               <a:pPr/>
-              <a:t>09/04/2013</a:t>
+              <a:t>11/04/2013</a:t>
             </a:fld>
             <a:endParaRPr lang="fr-BE"/>
           </a:p>
@@ -802,7 +1384,7 @@
             <a:fld id="{AA309A6D-C09C-4548-B29A-6CF363A7E532}" type="datetimeFigureOut">
               <a:rPr lang="fr-FR" smtClean="0"/>
               <a:pPr/>
-              <a:t>09/04/2013</a:t>
+              <a:t>11/04/2013</a:t>
             </a:fld>
             <a:endParaRPr lang="fr-BE"/>
           </a:p>
@@ -1039,7 +1621,7 @@
             <a:fld id="{AA309A6D-C09C-4548-B29A-6CF363A7E532}" type="datetimeFigureOut">
               <a:rPr lang="fr-FR" smtClean="0"/>
               <a:pPr/>
-              <a:t>09/04/2013</a:t>
+              <a:t>11/04/2013</a:t>
             </a:fld>
             <a:endParaRPr lang="fr-BE"/>
           </a:p>
@@ -1310,7 +1892,7 @@
             <a:fld id="{AA309A6D-C09C-4548-B29A-6CF363A7E532}" type="datetimeFigureOut">
               <a:rPr lang="fr-FR" smtClean="0"/>
               <a:pPr/>
-              <a:t>09/04/2013</a:t>
+              <a:t>11/04/2013</a:t>
             </a:fld>
             <a:endParaRPr lang="fr-BE"/>
           </a:p>
@@ -1532,7 +2114,7 @@
             <a:fld id="{AA309A6D-C09C-4548-B29A-6CF363A7E532}" type="datetimeFigureOut">
               <a:rPr lang="fr-FR" smtClean="0"/>
               <a:pPr/>
-              <a:t>09/04/2013</a:t>
+              <a:t>11/04/2013</a:t>
             </a:fld>
             <a:endParaRPr lang="fr-BE"/>
           </a:p>
@@ -1886,7 +2468,7 @@
             <a:fld id="{AA309A6D-C09C-4548-B29A-6CF363A7E532}" type="datetimeFigureOut">
               <a:rPr lang="fr-FR" smtClean="0"/>
               <a:pPr/>
-              <a:t>09/04/2013</a:t>
+              <a:t>11/04/2013</a:t>
             </a:fld>
             <a:endParaRPr lang="fr-BE"/>
           </a:p>
@@ -2120,7 +2702,7 @@
             <a:fld id="{AA309A6D-C09C-4548-B29A-6CF363A7E532}" type="datetimeFigureOut">
               <a:rPr lang="fr-FR" smtClean="0"/>
               <a:pPr/>
-              <a:t>09/04/2013</a:t>
+              <a:t>11/04/2013</a:t>
             </a:fld>
             <a:endParaRPr lang="fr-BE"/>
           </a:p>
@@ -2262,7 +2844,7 @@
             <a:fld id="{AA309A6D-C09C-4548-B29A-6CF363A7E532}" type="datetimeFigureOut">
               <a:rPr lang="fr-FR" smtClean="0"/>
               <a:pPr/>
-              <a:t>09/04/2013</a:t>
+              <a:t>11/04/2013</a:t>
             </a:fld>
             <a:endParaRPr lang="fr-BE"/>
           </a:p>
@@ -2541,7 +3123,7 @@
             <a:fld id="{AA309A6D-C09C-4548-B29A-6CF363A7E532}" type="datetimeFigureOut">
               <a:rPr lang="fr-FR" smtClean="0"/>
               <a:pPr/>
-              <a:t>09/04/2013</a:t>
+              <a:t>11/04/2013</a:t>
             </a:fld>
             <a:endParaRPr lang="fr-BE"/>
           </a:p>
@@ -2950,7 +3532,7 @@
             <a:fld id="{AA309A6D-C09C-4548-B29A-6CF363A7E532}" type="datetimeFigureOut">
               <a:rPr lang="fr-FR" smtClean="0"/>
               <a:pPr/>
-              <a:t>09/04/2013</a:t>
+              <a:t>11/04/2013</a:t>
             </a:fld>
             <a:endParaRPr lang="fr-BE"/>
           </a:p>
@@ -3290,7 +3872,7 @@
             <a:fld id="{AA309A6D-C09C-4548-B29A-6CF363A7E532}" type="datetimeFigureOut">
               <a:rPr lang="fr-FR" smtClean="0"/>
               <a:pPr/>
-              <a:t>09/04/2013</a:t>
+              <a:t>11/04/2013</a:t>
             </a:fld>
             <a:endParaRPr lang="fr-BE"/>
           </a:p>
@@ -4002,25 +4584,26 @@
           </a:p>
         </p:txBody>
       </p:sp>
-      <p:sp>
-        <p:nvSpPr>
-          <p:cNvPr id="3" name="Espace réservé du contenu 2"/>
-          <p:cNvSpPr>
-            <a:spLocks noGrp="1"/>
-          </p:cNvSpPr>
+      <p:graphicFrame>
+        <p:nvGraphicFramePr>
+          <p:cNvPr id="4" name="Espace réservé du contenu 3"/>
+          <p:cNvGraphicFramePr>
+            <a:graphicFrameLocks noGrp="1"/>
+          </p:cNvGraphicFramePr>
           <p:nvPr>
             <p:ph sz="quarter" idx="1"/>
           </p:nvPr>
-        </p:nvSpPr>
-        <p:spPr/>
-        <p:txBody>
-          <a:bodyPr/>
-          <a:lstStyle/>
-          <a:p>
-            <a:endParaRPr lang="fr-CA"/>
-          </a:p>
-        </p:txBody>
-      </p:sp>
+        </p:nvGraphicFramePr>
+        <p:xfrm>
+          <a:off x="457200" y="1219200"/>
+          <a:ext cx="8229600" cy="4937125"/>
+        </p:xfrm>
+        <a:graphic>
+          <a:graphicData uri="http://schemas.openxmlformats.org/drawingml/2006/chart">
+            <c:chart xmlns:c="http://schemas.openxmlformats.org/drawingml/2006/chart" xmlns:r="http://schemas.openxmlformats.org/officeDocument/2006/relationships" r:id="rId2"/>
+          </a:graphicData>
+        </a:graphic>
+      </p:graphicFrame>
     </p:spTree>
   </p:cSld>
   <p:clrMapOvr>
@@ -4069,88 +4652,33 @@
           <a:lstStyle/>
           <a:p>
             <a:r>
-              <a:rPr lang="en-CA" dirty="0" smtClean="0"/>
-              <a:t>Plan</a:t>
+              <a:rPr lang="en-CA" dirty="0" err="1" smtClean="0"/>
+              <a:t>Résultats</a:t>
             </a:r>
             <a:endParaRPr lang="fr-CA" dirty="0"/>
           </a:p>
         </p:txBody>
       </p:sp>
-      <p:sp>
-        <p:nvSpPr>
-          <p:cNvPr id="3" name="Espace réservé du contenu 2"/>
-          <p:cNvSpPr>
-            <a:spLocks noGrp="1"/>
-          </p:cNvSpPr>
+      <p:graphicFrame>
+        <p:nvGraphicFramePr>
+          <p:cNvPr id="6" name="Espace réservé du contenu 5"/>
+          <p:cNvGraphicFramePr>
+            <a:graphicFrameLocks noGrp="1"/>
+          </p:cNvGraphicFramePr>
           <p:nvPr>
             <p:ph sz="quarter" idx="1"/>
           </p:nvPr>
-        </p:nvSpPr>
-        <p:spPr/>
-        <p:txBody>
-          <a:bodyPr/>
-          <a:lstStyle/>
-          <a:p>
-            <a:r>
-              <a:rPr lang="en-CA" dirty="0" err="1" smtClean="0"/>
-              <a:t>Planification</a:t>
-            </a:r>
-            <a:r>
-              <a:rPr lang="en-CA" dirty="0" smtClean="0"/>
-              <a:t> de </a:t>
-            </a:r>
-            <a:r>
-              <a:rPr lang="en-CA" dirty="0" err="1" smtClean="0"/>
-              <a:t>trajectoires</a:t>
-            </a:r>
-            <a:endParaRPr lang="en-CA" dirty="0" smtClean="0"/>
-          </a:p>
-          <a:p>
-            <a:r>
-              <a:rPr lang="en-CA" dirty="0" err="1" smtClean="0"/>
-              <a:t>Planification</a:t>
-            </a:r>
-            <a:r>
-              <a:rPr lang="en-CA" dirty="0" smtClean="0"/>
-              <a:t> </a:t>
-            </a:r>
-            <a:r>
-              <a:rPr lang="en-CA" dirty="0" err="1" smtClean="0"/>
-              <a:t>tactique</a:t>
-            </a:r>
-            <a:endParaRPr lang="en-CA" dirty="0" smtClean="0"/>
-          </a:p>
-          <a:p>
-            <a:r>
-              <a:rPr lang="en-CA" dirty="0" err="1" smtClean="0"/>
-              <a:t>Résultats</a:t>
-            </a:r>
-            <a:endParaRPr lang="en-CA" dirty="0" smtClean="0"/>
-          </a:p>
-          <a:p>
-            <a:r>
-              <a:rPr lang="en-CA" b="1" dirty="0" err="1" smtClean="0"/>
-              <a:t>Problèmes</a:t>
-            </a:r>
-            <a:r>
-              <a:rPr lang="en-CA" b="1" dirty="0" smtClean="0"/>
-              <a:t> </a:t>
-            </a:r>
-            <a:r>
-              <a:rPr lang="en-CA" b="1" dirty="0" err="1" smtClean="0"/>
-              <a:t>rencontrés</a:t>
-            </a:r>
-            <a:endParaRPr lang="en-CA" b="1" dirty="0" smtClean="0"/>
-          </a:p>
-          <a:p>
-            <a:r>
-              <a:rPr lang="en-CA" dirty="0" smtClean="0"/>
-              <a:t>Conclusion</a:t>
-            </a:r>
-            <a:endParaRPr lang="fr-CA" dirty="0"/>
-          </a:p>
-        </p:txBody>
-      </p:sp>
+        </p:nvGraphicFramePr>
+        <p:xfrm>
+          <a:off x="457200" y="1219200"/>
+          <a:ext cx="8229600" cy="4937125"/>
+        </p:xfrm>
+        <a:graphic>
+          <a:graphicData uri="http://schemas.openxmlformats.org/drawingml/2006/chart">
+            <c:chart xmlns:c="http://schemas.openxmlformats.org/drawingml/2006/chart" xmlns:r="http://schemas.openxmlformats.org/officeDocument/2006/relationships" r:id="rId2"/>
+          </a:graphicData>
+        </a:graphic>
+      </p:graphicFrame>
     </p:spTree>
   </p:cSld>
   <p:clrMapOvr>
@@ -4167,6 +4695,894 @@
 </file>
 
 <file path=ppt/slides/slide12.xml><?xml version="1.0" encoding="utf-8"?>
+<p:sld xmlns:a="http://schemas.openxmlformats.org/drawingml/2006/main" xmlns:r="http://schemas.openxmlformats.org/officeDocument/2006/relationships" xmlns:p="http://schemas.openxmlformats.org/presentationml/2006/main">
+  <p:cSld>
+    <p:spTree>
+      <p:nvGrpSpPr>
+        <p:cNvPr id="1" name=""/>
+        <p:cNvGrpSpPr/>
+        <p:nvPr/>
+      </p:nvGrpSpPr>
+      <p:grpSpPr>
+        <a:xfrm>
+          <a:off x="0" y="0"/>
+          <a:ext cx="0" cy="0"/>
+          <a:chOff x="0" y="0"/>
+          <a:chExt cx="0" cy="0"/>
+        </a:xfrm>
+      </p:grpSpPr>
+      <p:sp>
+        <p:nvSpPr>
+          <p:cNvPr id="2" name="Titre 1"/>
+          <p:cNvSpPr>
+            <a:spLocks noGrp="1"/>
+          </p:cNvSpPr>
+          <p:nvPr>
+            <p:ph type="title"/>
+          </p:nvPr>
+        </p:nvSpPr>
+        <p:spPr/>
+        <p:txBody>
+          <a:bodyPr/>
+          <a:lstStyle/>
+          <a:p>
+            <a:r>
+              <a:rPr lang="en-CA" dirty="0" err="1" smtClean="0"/>
+              <a:t>Résultats</a:t>
+            </a:r>
+            <a:endParaRPr lang="fr-CA" dirty="0"/>
+          </a:p>
+        </p:txBody>
+      </p:sp>
+      <p:graphicFrame>
+        <p:nvGraphicFramePr>
+          <p:cNvPr id="6" name="Espace réservé du contenu 5"/>
+          <p:cNvGraphicFramePr>
+            <a:graphicFrameLocks noGrp="1"/>
+          </p:cNvGraphicFramePr>
+          <p:nvPr>
+            <p:ph sz="quarter" idx="1"/>
+          </p:nvPr>
+        </p:nvGraphicFramePr>
+        <p:xfrm>
+          <a:off x="457200" y="1219200"/>
+          <a:ext cx="8229600" cy="4937125"/>
+        </p:xfrm>
+        <a:graphic>
+          <a:graphicData uri="http://schemas.openxmlformats.org/drawingml/2006/chart">
+            <c:chart xmlns:c="http://schemas.openxmlformats.org/drawingml/2006/chart" xmlns:r="http://schemas.openxmlformats.org/officeDocument/2006/relationships" r:id="rId2"/>
+          </a:graphicData>
+        </a:graphic>
+      </p:graphicFrame>
+    </p:spTree>
+  </p:cSld>
+  <p:clrMapOvr>
+    <a:masterClrMapping/>
+  </p:clrMapOvr>
+  <p:timing>
+    <p:tnLst>
+      <p:par>
+        <p:cTn id="1" dur="indefinite" restart="never" nodeType="tmRoot"/>
+      </p:par>
+    </p:tnLst>
+  </p:timing>
+</p:sld>
+</file>
+
+<file path=ppt/slides/slide13.xml><?xml version="1.0" encoding="utf-8"?>
+<p:sld xmlns:a="http://schemas.openxmlformats.org/drawingml/2006/main" xmlns:r="http://schemas.openxmlformats.org/officeDocument/2006/relationships" xmlns:p="http://schemas.openxmlformats.org/presentationml/2006/main">
+  <p:cSld>
+    <p:spTree>
+      <p:nvGrpSpPr>
+        <p:cNvPr id="1" name=""/>
+        <p:cNvGrpSpPr/>
+        <p:nvPr/>
+      </p:nvGrpSpPr>
+      <p:grpSpPr>
+        <a:xfrm>
+          <a:off x="0" y="0"/>
+          <a:ext cx="0" cy="0"/>
+          <a:chOff x="0" y="0"/>
+          <a:chExt cx="0" cy="0"/>
+        </a:xfrm>
+      </p:grpSpPr>
+      <p:sp>
+        <p:nvSpPr>
+          <p:cNvPr id="2" name="Titre 1"/>
+          <p:cNvSpPr>
+            <a:spLocks noGrp="1"/>
+          </p:cNvSpPr>
+          <p:nvPr>
+            <p:ph type="title"/>
+          </p:nvPr>
+        </p:nvSpPr>
+        <p:spPr/>
+        <p:txBody>
+          <a:bodyPr/>
+          <a:lstStyle/>
+          <a:p>
+            <a:r>
+              <a:rPr lang="en-CA" dirty="0" err="1" smtClean="0"/>
+              <a:t>Résultats</a:t>
+            </a:r>
+            <a:endParaRPr lang="fr-CA" dirty="0"/>
+          </a:p>
+        </p:txBody>
+      </p:sp>
+      <p:graphicFrame>
+        <p:nvGraphicFramePr>
+          <p:cNvPr id="6" name="Espace réservé du contenu 5"/>
+          <p:cNvGraphicFramePr>
+            <a:graphicFrameLocks noGrp="1"/>
+          </p:cNvGraphicFramePr>
+          <p:nvPr>
+            <p:ph sz="quarter" idx="1"/>
+          </p:nvPr>
+        </p:nvGraphicFramePr>
+        <p:xfrm>
+          <a:off x="457200" y="1219200"/>
+          <a:ext cx="8219256" cy="2026920"/>
+        </p:xfrm>
+        <a:graphic>
+          <a:graphicData uri="http://schemas.openxmlformats.org/drawingml/2006/table">
+            <a:tbl>
+              <a:tblPr firstRow="1" bandRow="1">
+                <a:tableStyleId>{5C22544A-7EE6-4342-B048-85BDC9FD1C3A}</a:tableStyleId>
+              </a:tblPr>
+              <a:tblGrid>
+                <a:gridCol w="2054814"/>
+                <a:gridCol w="2054814"/>
+                <a:gridCol w="2054814"/>
+                <a:gridCol w="2054814"/>
+              </a:tblGrid>
+              <a:tr h="370840">
+                <a:tc>
+                  <a:txBody>
+                    <a:bodyPr/>
+                    <a:lstStyle/>
+                    <a:p>
+                      <a:r>
+                        <a:rPr lang="en-CA" dirty="0" smtClean="0"/>
+                        <a:t>Plan +</a:t>
+                      </a:r>
+                    </a:p>
+                    <a:p>
+                      <a:r>
+                        <a:rPr lang="en-CA" dirty="0" smtClean="0"/>
+                        <a:t>Pas </a:t>
+                      </a:r>
+                      <a:r>
+                        <a:rPr lang="en-CA" dirty="0" err="1" smtClean="0"/>
+                        <a:t>d’entraînement</a:t>
+                      </a:r>
+                      <a:endParaRPr lang="fr-CA" dirty="0"/>
+                    </a:p>
+                  </a:txBody>
+                  <a:tcPr/>
+                </a:tc>
+                <a:tc>
+                  <a:txBody>
+                    <a:bodyPr/>
+                    <a:lstStyle/>
+                    <a:p>
+                      <a:r>
+                        <a:rPr lang="en-CA" dirty="0" smtClean="0"/>
+                        <a:t>Balanced</a:t>
+                      </a:r>
+                    </a:p>
+                    <a:p>
+                      <a:r>
+                        <a:rPr lang="en-CA" dirty="0" smtClean="0"/>
+                        <a:t>Commander</a:t>
+                      </a:r>
+                      <a:endParaRPr lang="fr-CA" dirty="0" smtClean="0"/>
+                    </a:p>
+                    <a:p>
+                      <a:endParaRPr lang="fr-CA" dirty="0"/>
+                    </a:p>
+                  </a:txBody>
+                  <a:tcPr/>
+                </a:tc>
+                <a:tc>
+                  <a:txBody>
+                    <a:bodyPr/>
+                    <a:lstStyle/>
+                    <a:p>
+                      <a:r>
+                        <a:rPr lang="en-CA" dirty="0" smtClean="0"/>
+                        <a:t>Random</a:t>
+                      </a:r>
+                    </a:p>
+                    <a:p>
+                      <a:r>
+                        <a:rPr lang="en-CA" dirty="0" smtClean="0"/>
+                        <a:t>Commander</a:t>
+                      </a:r>
+                      <a:endParaRPr lang="fr-CA" dirty="0" smtClean="0"/>
+                    </a:p>
+                    <a:p>
+                      <a:endParaRPr lang="fr-CA" dirty="0"/>
+                    </a:p>
+                  </a:txBody>
+                  <a:tcPr/>
+                </a:tc>
+                <a:tc>
+                  <a:txBody>
+                    <a:bodyPr/>
+                    <a:lstStyle/>
+                    <a:p>
+                      <a:pPr marL="0" marR="0" indent="0" algn="l" defTabSz="914400" rtl="0" eaLnBrk="1" fontAlgn="auto" latinLnBrk="0" hangingPunct="1">
+                        <a:lnSpc>
+                          <a:spcPct val="100000"/>
+                        </a:lnSpc>
+                        <a:spcBef>
+                          <a:spcPts val="0"/>
+                        </a:spcBef>
+                        <a:spcAft>
+                          <a:spcPts val="0"/>
+                        </a:spcAft>
+                        <a:buClrTx/>
+                        <a:buSzTx/>
+                        <a:buFontTx/>
+                        <a:buNone/>
+                        <a:tabLst/>
+                        <a:defRPr/>
+                      </a:pPr>
+                      <a:r>
+                        <a:rPr lang="en-CA" dirty="0" smtClean="0"/>
+                        <a:t>Terminator</a:t>
+                      </a:r>
+                      <a:endParaRPr lang="fr-CA" dirty="0" smtClean="0"/>
+                    </a:p>
+                    <a:p>
+                      <a:endParaRPr lang="fr-CA" dirty="0"/>
+                    </a:p>
+                  </a:txBody>
+                  <a:tcPr/>
+                </a:tc>
+              </a:tr>
+              <a:tr h="370840">
+                <a:tc>
+                  <a:txBody>
+                    <a:bodyPr/>
+                    <a:lstStyle/>
+                    <a:p>
+                      <a:r>
+                        <a:rPr lang="en-CA" dirty="0" smtClean="0"/>
+                        <a:t>Match 1</a:t>
+                      </a:r>
+                      <a:endParaRPr lang="fr-CA" dirty="0"/>
+                    </a:p>
+                  </a:txBody>
+                  <a:tcPr/>
+                </a:tc>
+                <a:tc>
+                  <a:txBody>
+                    <a:bodyPr/>
+                    <a:lstStyle/>
+                    <a:p>
+                      <a:r>
+                        <a:rPr lang="en-CA" dirty="0" smtClean="0"/>
+                        <a:t>0 – 1</a:t>
+                      </a:r>
+                      <a:endParaRPr lang="fr-CA" dirty="0"/>
+                    </a:p>
+                  </a:txBody>
+                  <a:tcPr/>
+                </a:tc>
+                <a:tc>
+                  <a:txBody>
+                    <a:bodyPr/>
+                    <a:lstStyle/>
+                    <a:p>
+                      <a:r>
+                        <a:rPr lang="en-CA" dirty="0" smtClean="0"/>
+                        <a:t>0 – 0 </a:t>
+                      </a:r>
+                      <a:endParaRPr lang="fr-CA" dirty="0"/>
+                    </a:p>
+                  </a:txBody>
+                  <a:tcPr/>
+                </a:tc>
+                <a:tc>
+                  <a:txBody>
+                    <a:bodyPr/>
+                    <a:lstStyle/>
+                    <a:p>
+                      <a:r>
+                        <a:rPr lang="en-CA" dirty="0" smtClean="0"/>
+                        <a:t>0 – 3</a:t>
+                      </a:r>
+                      <a:endParaRPr lang="fr-CA" dirty="0"/>
+                    </a:p>
+                  </a:txBody>
+                  <a:tcPr/>
+                </a:tc>
+              </a:tr>
+              <a:tr h="370840">
+                <a:tc>
+                  <a:txBody>
+                    <a:bodyPr/>
+                    <a:lstStyle/>
+                    <a:p>
+                      <a:r>
+                        <a:rPr lang="en-CA" dirty="0" smtClean="0"/>
+                        <a:t>Match 2</a:t>
+                      </a:r>
+                      <a:endParaRPr lang="fr-CA" dirty="0"/>
+                    </a:p>
+                  </a:txBody>
+                  <a:tcPr/>
+                </a:tc>
+                <a:tc>
+                  <a:txBody>
+                    <a:bodyPr/>
+                    <a:lstStyle/>
+                    <a:p>
+                      <a:r>
+                        <a:rPr lang="en-CA" dirty="0" smtClean="0"/>
+                        <a:t>0 – 2</a:t>
+                      </a:r>
+                      <a:endParaRPr lang="fr-CA" dirty="0"/>
+                    </a:p>
+                  </a:txBody>
+                  <a:tcPr/>
+                </a:tc>
+                <a:tc>
+                  <a:txBody>
+                    <a:bodyPr/>
+                    <a:lstStyle/>
+                    <a:p>
+                      <a:r>
+                        <a:rPr lang="en-CA" dirty="0" smtClean="0"/>
+                        <a:t>0 – 0 </a:t>
+                      </a:r>
+                      <a:endParaRPr lang="fr-CA" dirty="0"/>
+                    </a:p>
+                  </a:txBody>
+                  <a:tcPr/>
+                </a:tc>
+                <a:tc>
+                  <a:txBody>
+                    <a:bodyPr/>
+                    <a:lstStyle/>
+                    <a:p>
+                      <a:r>
+                        <a:rPr lang="en-CA" dirty="0" smtClean="0"/>
+                        <a:t>0 – 4</a:t>
+                      </a:r>
+                      <a:endParaRPr lang="fr-CA" dirty="0"/>
+                    </a:p>
+                  </a:txBody>
+                  <a:tcPr/>
+                </a:tc>
+              </a:tr>
+              <a:tr h="370840">
+                <a:tc>
+                  <a:txBody>
+                    <a:bodyPr/>
+                    <a:lstStyle/>
+                    <a:p>
+                      <a:r>
+                        <a:rPr lang="en-CA" dirty="0" smtClean="0"/>
+                        <a:t>Match 3</a:t>
+                      </a:r>
+                      <a:endParaRPr lang="fr-CA" dirty="0"/>
+                    </a:p>
+                  </a:txBody>
+                  <a:tcPr/>
+                </a:tc>
+                <a:tc>
+                  <a:txBody>
+                    <a:bodyPr/>
+                    <a:lstStyle/>
+                    <a:p>
+                      <a:r>
+                        <a:rPr lang="en-CA" dirty="0" smtClean="0"/>
+                        <a:t>0 - 0</a:t>
+                      </a:r>
+                      <a:endParaRPr lang="fr-CA" dirty="0"/>
+                    </a:p>
+                  </a:txBody>
+                  <a:tcPr/>
+                </a:tc>
+                <a:tc>
+                  <a:txBody>
+                    <a:bodyPr/>
+                    <a:lstStyle/>
+                    <a:p>
+                      <a:r>
+                        <a:rPr lang="en-CA" dirty="0" smtClean="0"/>
+                        <a:t>0 – 0 </a:t>
+                      </a:r>
+                      <a:endParaRPr lang="fr-CA" dirty="0"/>
+                    </a:p>
+                  </a:txBody>
+                  <a:tcPr/>
+                </a:tc>
+                <a:tc>
+                  <a:txBody>
+                    <a:bodyPr/>
+                    <a:lstStyle/>
+                    <a:p>
+                      <a:r>
+                        <a:rPr lang="en-CA" dirty="0" smtClean="0"/>
+                        <a:t>0 – 2</a:t>
+                      </a:r>
+                      <a:endParaRPr lang="fr-CA" dirty="0"/>
+                    </a:p>
+                  </a:txBody>
+                  <a:tcPr/>
+                </a:tc>
+              </a:tr>
+            </a:tbl>
+          </a:graphicData>
+        </a:graphic>
+      </p:graphicFrame>
+      <p:graphicFrame>
+        <p:nvGraphicFramePr>
+          <p:cNvPr id="7" name="Espace réservé du contenu 5"/>
+          <p:cNvGraphicFramePr>
+            <a:graphicFrameLocks/>
+          </p:cNvGraphicFramePr>
+          <p:nvPr/>
+        </p:nvGraphicFramePr>
+        <p:xfrm>
+          <a:off x="467544" y="3933056"/>
+          <a:ext cx="8219256" cy="2026920"/>
+        </p:xfrm>
+        <a:graphic>
+          <a:graphicData uri="http://schemas.openxmlformats.org/drawingml/2006/table">
+            <a:tbl>
+              <a:tblPr firstRow="1" bandRow="1">
+                <a:tableStyleId>{5C22544A-7EE6-4342-B048-85BDC9FD1C3A}</a:tableStyleId>
+              </a:tblPr>
+              <a:tblGrid>
+                <a:gridCol w="2054814"/>
+                <a:gridCol w="2054814"/>
+                <a:gridCol w="2054814"/>
+                <a:gridCol w="2054814"/>
+              </a:tblGrid>
+              <a:tr h="370840">
+                <a:tc>
+                  <a:txBody>
+                    <a:bodyPr/>
+                    <a:lstStyle/>
+                    <a:p>
+                      <a:r>
+                        <a:rPr lang="en-CA" dirty="0" smtClean="0"/>
+                        <a:t>Plan</a:t>
+                      </a:r>
+                      <a:r>
+                        <a:rPr lang="en-CA" baseline="0" dirty="0" smtClean="0"/>
+                        <a:t> </a:t>
+                      </a:r>
+                      <a:r>
+                        <a:rPr lang="en-CA" dirty="0" smtClean="0"/>
+                        <a:t>+ </a:t>
+                      </a:r>
+                      <a:r>
+                        <a:rPr lang="en-CA" dirty="0" err="1" smtClean="0"/>
+                        <a:t>d’entraînement</a:t>
+                      </a:r>
+                      <a:endParaRPr lang="fr-CA" dirty="0"/>
+                    </a:p>
+                  </a:txBody>
+                  <a:tcPr/>
+                </a:tc>
+                <a:tc>
+                  <a:txBody>
+                    <a:bodyPr/>
+                    <a:lstStyle/>
+                    <a:p>
+                      <a:r>
+                        <a:rPr lang="en-CA" dirty="0" smtClean="0"/>
+                        <a:t>Balanced</a:t>
+                      </a:r>
+                    </a:p>
+                    <a:p>
+                      <a:r>
+                        <a:rPr lang="en-CA" dirty="0" smtClean="0"/>
+                        <a:t>Commander</a:t>
+                      </a:r>
+                      <a:endParaRPr lang="fr-CA" dirty="0" smtClean="0"/>
+                    </a:p>
+                    <a:p>
+                      <a:endParaRPr lang="fr-CA" dirty="0"/>
+                    </a:p>
+                  </a:txBody>
+                  <a:tcPr/>
+                </a:tc>
+                <a:tc>
+                  <a:txBody>
+                    <a:bodyPr/>
+                    <a:lstStyle/>
+                    <a:p>
+                      <a:r>
+                        <a:rPr lang="en-CA" dirty="0" smtClean="0"/>
+                        <a:t>Random</a:t>
+                      </a:r>
+                    </a:p>
+                    <a:p>
+                      <a:r>
+                        <a:rPr lang="en-CA" dirty="0" smtClean="0"/>
+                        <a:t>Commander</a:t>
+                      </a:r>
+                      <a:endParaRPr lang="fr-CA" dirty="0" smtClean="0"/>
+                    </a:p>
+                    <a:p>
+                      <a:endParaRPr lang="fr-CA" dirty="0"/>
+                    </a:p>
+                  </a:txBody>
+                  <a:tcPr/>
+                </a:tc>
+                <a:tc>
+                  <a:txBody>
+                    <a:bodyPr/>
+                    <a:lstStyle/>
+                    <a:p>
+                      <a:pPr marL="0" marR="0" indent="0" algn="l" defTabSz="914400" rtl="0" eaLnBrk="1" fontAlgn="auto" latinLnBrk="0" hangingPunct="1">
+                        <a:lnSpc>
+                          <a:spcPct val="100000"/>
+                        </a:lnSpc>
+                        <a:spcBef>
+                          <a:spcPts val="0"/>
+                        </a:spcBef>
+                        <a:spcAft>
+                          <a:spcPts val="0"/>
+                        </a:spcAft>
+                        <a:buClrTx/>
+                        <a:buSzTx/>
+                        <a:buFontTx/>
+                        <a:buNone/>
+                        <a:tabLst/>
+                        <a:defRPr/>
+                      </a:pPr>
+                      <a:r>
+                        <a:rPr lang="en-CA" dirty="0" smtClean="0"/>
+                        <a:t>Terminator</a:t>
+                      </a:r>
+                      <a:endParaRPr lang="fr-CA" dirty="0" smtClean="0"/>
+                    </a:p>
+                    <a:p>
+                      <a:endParaRPr lang="fr-CA" dirty="0"/>
+                    </a:p>
+                  </a:txBody>
+                  <a:tcPr/>
+                </a:tc>
+              </a:tr>
+              <a:tr h="370840">
+                <a:tc>
+                  <a:txBody>
+                    <a:bodyPr/>
+                    <a:lstStyle/>
+                    <a:p>
+                      <a:r>
+                        <a:rPr lang="en-CA" dirty="0" smtClean="0"/>
+                        <a:t>Match 1</a:t>
+                      </a:r>
+                      <a:endParaRPr lang="fr-CA" dirty="0"/>
+                    </a:p>
+                  </a:txBody>
+                  <a:tcPr/>
+                </a:tc>
+                <a:tc>
+                  <a:txBody>
+                    <a:bodyPr/>
+                    <a:lstStyle/>
+                    <a:p>
+                      <a:r>
+                        <a:rPr lang="en-CA" dirty="0" smtClean="0"/>
+                        <a:t>0 – 0</a:t>
+                      </a:r>
+                      <a:endParaRPr lang="fr-CA" dirty="0"/>
+                    </a:p>
+                  </a:txBody>
+                  <a:tcPr/>
+                </a:tc>
+                <a:tc>
+                  <a:txBody>
+                    <a:bodyPr/>
+                    <a:lstStyle/>
+                    <a:p>
+                      <a:r>
+                        <a:rPr lang="en-CA" dirty="0" smtClean="0"/>
+                        <a:t>0 – 1</a:t>
+                      </a:r>
+                      <a:endParaRPr lang="fr-CA" dirty="0"/>
+                    </a:p>
+                  </a:txBody>
+                  <a:tcPr/>
+                </a:tc>
+                <a:tc>
+                  <a:txBody>
+                    <a:bodyPr/>
+                    <a:lstStyle/>
+                    <a:p>
+                      <a:r>
+                        <a:rPr lang="en-CA" dirty="0" smtClean="0"/>
+                        <a:t>0 – 3</a:t>
+                      </a:r>
+                      <a:endParaRPr lang="fr-CA" dirty="0"/>
+                    </a:p>
+                  </a:txBody>
+                  <a:tcPr/>
+                </a:tc>
+              </a:tr>
+              <a:tr h="370840">
+                <a:tc>
+                  <a:txBody>
+                    <a:bodyPr/>
+                    <a:lstStyle/>
+                    <a:p>
+                      <a:r>
+                        <a:rPr lang="en-CA" dirty="0" smtClean="0"/>
+                        <a:t>Match 2</a:t>
+                      </a:r>
+                      <a:endParaRPr lang="fr-CA" dirty="0"/>
+                    </a:p>
+                  </a:txBody>
+                  <a:tcPr/>
+                </a:tc>
+                <a:tc>
+                  <a:txBody>
+                    <a:bodyPr/>
+                    <a:lstStyle/>
+                    <a:p>
+                      <a:r>
+                        <a:rPr lang="en-CA" dirty="0" smtClean="0"/>
+                        <a:t>0</a:t>
+                      </a:r>
+                      <a:r>
+                        <a:rPr lang="en-CA" baseline="0" dirty="0" smtClean="0"/>
+                        <a:t> – 0</a:t>
+                      </a:r>
+                      <a:endParaRPr lang="fr-CA" dirty="0"/>
+                    </a:p>
+                  </a:txBody>
+                  <a:tcPr/>
+                </a:tc>
+                <a:tc>
+                  <a:txBody>
+                    <a:bodyPr/>
+                    <a:lstStyle/>
+                    <a:p>
+                      <a:r>
+                        <a:rPr lang="en-CA" dirty="0" smtClean="0"/>
+                        <a:t>0 – 1</a:t>
+                      </a:r>
+                      <a:endParaRPr lang="fr-CA" dirty="0"/>
+                    </a:p>
+                  </a:txBody>
+                  <a:tcPr/>
+                </a:tc>
+                <a:tc>
+                  <a:txBody>
+                    <a:bodyPr/>
+                    <a:lstStyle/>
+                    <a:p>
+                      <a:r>
+                        <a:rPr lang="en-CA" dirty="0" smtClean="0"/>
+                        <a:t>0 – 3</a:t>
+                      </a:r>
+                      <a:endParaRPr lang="fr-CA" dirty="0"/>
+                    </a:p>
+                  </a:txBody>
+                  <a:tcPr/>
+                </a:tc>
+              </a:tr>
+              <a:tr h="370840">
+                <a:tc>
+                  <a:txBody>
+                    <a:bodyPr/>
+                    <a:lstStyle/>
+                    <a:p>
+                      <a:r>
+                        <a:rPr lang="en-CA" dirty="0" smtClean="0"/>
+                        <a:t>Match 3</a:t>
+                      </a:r>
+                      <a:endParaRPr lang="fr-CA" dirty="0"/>
+                    </a:p>
+                  </a:txBody>
+                  <a:tcPr/>
+                </a:tc>
+                <a:tc>
+                  <a:txBody>
+                    <a:bodyPr/>
+                    <a:lstStyle/>
+                    <a:p>
+                      <a:r>
+                        <a:rPr lang="en-CA" dirty="0" smtClean="0"/>
+                        <a:t>0 –</a:t>
+                      </a:r>
+                      <a:r>
+                        <a:rPr lang="en-CA" baseline="0" dirty="0" smtClean="0"/>
+                        <a:t> 0 </a:t>
+                      </a:r>
+                      <a:endParaRPr lang="fr-CA" dirty="0"/>
+                    </a:p>
+                  </a:txBody>
+                  <a:tcPr/>
+                </a:tc>
+                <a:tc>
+                  <a:txBody>
+                    <a:bodyPr/>
+                    <a:lstStyle/>
+                    <a:p>
+                      <a:r>
+                        <a:rPr lang="en-CA" dirty="0" smtClean="0"/>
+                        <a:t>1 – 0 </a:t>
+                      </a:r>
+                      <a:endParaRPr lang="fr-CA" dirty="0"/>
+                    </a:p>
+                  </a:txBody>
+                  <a:tcPr/>
+                </a:tc>
+                <a:tc>
+                  <a:txBody>
+                    <a:bodyPr/>
+                    <a:lstStyle/>
+                    <a:p>
+                      <a:r>
+                        <a:rPr lang="en-CA" dirty="0" smtClean="0"/>
+                        <a:t>1 – 1</a:t>
+                      </a:r>
+                      <a:endParaRPr lang="fr-CA" dirty="0"/>
+                    </a:p>
+                  </a:txBody>
+                  <a:tcPr/>
+                </a:tc>
+              </a:tr>
+            </a:tbl>
+          </a:graphicData>
+        </a:graphic>
+      </p:graphicFrame>
+    </p:spTree>
+  </p:cSld>
+  <p:clrMapOvr>
+    <a:masterClrMapping/>
+  </p:clrMapOvr>
+  <p:timing>
+    <p:tnLst>
+      <p:par>
+        <p:cTn id="1" dur="indefinite" restart="never" nodeType="tmRoot"/>
+      </p:par>
+    </p:tnLst>
+  </p:timing>
+</p:sld>
+</file>
+
+<file path=ppt/slides/slide14.xml><?xml version="1.0" encoding="utf-8"?>
+<p:sld xmlns:a="http://schemas.openxmlformats.org/drawingml/2006/main" xmlns:r="http://schemas.openxmlformats.org/officeDocument/2006/relationships" xmlns:p="http://schemas.openxmlformats.org/presentationml/2006/main">
+  <p:cSld>
+    <p:spTree>
+      <p:nvGrpSpPr>
+        <p:cNvPr id="1" name=""/>
+        <p:cNvGrpSpPr/>
+        <p:nvPr/>
+      </p:nvGrpSpPr>
+      <p:grpSpPr>
+        <a:xfrm>
+          <a:off x="0" y="0"/>
+          <a:ext cx="0" cy="0"/>
+          <a:chOff x="0" y="0"/>
+          <a:chExt cx="0" cy="0"/>
+        </a:xfrm>
+      </p:grpSpPr>
+      <p:sp>
+        <p:nvSpPr>
+          <p:cNvPr id="2" name="Titre 1"/>
+          <p:cNvSpPr>
+            <a:spLocks noGrp="1"/>
+          </p:cNvSpPr>
+          <p:nvPr>
+            <p:ph type="title"/>
+          </p:nvPr>
+        </p:nvSpPr>
+        <p:spPr/>
+        <p:txBody>
+          <a:bodyPr/>
+          <a:lstStyle/>
+          <a:p>
+            <a:r>
+              <a:rPr lang="en-CA" dirty="0" smtClean="0"/>
+              <a:t>Plan</a:t>
+            </a:r>
+            <a:endParaRPr lang="fr-CA" dirty="0"/>
+          </a:p>
+        </p:txBody>
+      </p:sp>
+      <p:sp>
+        <p:nvSpPr>
+          <p:cNvPr id="3" name="Espace réservé du contenu 2"/>
+          <p:cNvSpPr>
+            <a:spLocks noGrp="1"/>
+          </p:cNvSpPr>
+          <p:nvPr>
+            <p:ph sz="quarter" idx="1"/>
+          </p:nvPr>
+        </p:nvSpPr>
+        <p:spPr/>
+        <p:txBody>
+          <a:bodyPr/>
+          <a:lstStyle/>
+          <a:p>
+            <a:r>
+              <a:rPr lang="en-CA" dirty="0" err="1" smtClean="0"/>
+              <a:t>Planification</a:t>
+            </a:r>
+            <a:r>
+              <a:rPr lang="en-CA" dirty="0" smtClean="0"/>
+              <a:t> de </a:t>
+            </a:r>
+            <a:r>
+              <a:rPr lang="en-CA" dirty="0" err="1" smtClean="0"/>
+              <a:t>trajectoires</a:t>
+            </a:r>
+            <a:endParaRPr lang="en-CA" dirty="0" smtClean="0"/>
+          </a:p>
+          <a:p>
+            <a:r>
+              <a:rPr lang="en-CA" dirty="0" err="1" smtClean="0"/>
+              <a:t>Planification</a:t>
+            </a:r>
+            <a:r>
+              <a:rPr lang="en-CA" dirty="0" smtClean="0"/>
+              <a:t> </a:t>
+            </a:r>
+            <a:r>
+              <a:rPr lang="en-CA" dirty="0" err="1" smtClean="0"/>
+              <a:t>tactique</a:t>
+            </a:r>
+            <a:endParaRPr lang="en-CA" dirty="0" smtClean="0"/>
+          </a:p>
+          <a:p>
+            <a:r>
+              <a:rPr lang="en-CA" dirty="0" err="1" smtClean="0"/>
+              <a:t>Résultats</a:t>
+            </a:r>
+            <a:endParaRPr lang="en-CA" dirty="0" smtClean="0"/>
+          </a:p>
+          <a:p>
+            <a:r>
+              <a:rPr lang="en-CA" b="1" dirty="0" err="1" smtClean="0"/>
+              <a:t>Problèmes</a:t>
+            </a:r>
+            <a:r>
+              <a:rPr lang="en-CA" b="1" dirty="0" smtClean="0"/>
+              <a:t> </a:t>
+            </a:r>
+            <a:r>
+              <a:rPr lang="en-CA" b="1" dirty="0" err="1" smtClean="0"/>
+              <a:t>rencontrés</a:t>
+            </a:r>
+            <a:endParaRPr lang="en-CA" b="1" dirty="0" smtClean="0"/>
+          </a:p>
+          <a:p>
+            <a:r>
+              <a:rPr lang="en-CA" dirty="0" smtClean="0"/>
+              <a:t>Conclusion</a:t>
+            </a:r>
+            <a:endParaRPr lang="fr-CA" dirty="0"/>
+          </a:p>
+        </p:txBody>
+      </p:sp>
+    </p:spTree>
+  </p:cSld>
+  <p:clrMapOvr>
+    <a:masterClrMapping/>
+  </p:clrMapOvr>
+  <p:timing>
+    <p:tnLst>
+      <p:par>
+        <p:cTn id="1" dur="indefinite" restart="never" nodeType="tmRoot"/>
+      </p:par>
+    </p:tnLst>
+  </p:timing>
+</p:sld>
+</file>
+
+<file path=ppt/slides/slide15.xml><?xml version="1.0" encoding="utf-8"?>
 <p:sld xmlns:a="http://schemas.openxmlformats.org/drawingml/2006/main" xmlns:r="http://schemas.openxmlformats.org/officeDocument/2006/relationships" xmlns:p="http://schemas.openxmlformats.org/presentationml/2006/main">
   <p:cSld>
     <p:spTree>
@@ -4622,7 +6038,7 @@
 </p:sld>
 </file>
 
-<file path=ppt/slides/slide13.xml><?xml version="1.0" encoding="utf-8"?>
+<file path=ppt/slides/slide16.xml><?xml version="1.0" encoding="utf-8"?>
 <p:sld xmlns:a="http://schemas.openxmlformats.org/drawingml/2006/main" xmlns:r="http://schemas.openxmlformats.org/officeDocument/2006/relationships" xmlns:p="http://schemas.openxmlformats.org/presentationml/2006/main">
   <p:cSld>
     <p:spTree>
@@ -4758,7 +6174,7 @@
 </p:sld>
 </file>
 
-<file path=ppt/slides/slide14.xml><?xml version="1.0" encoding="utf-8"?>
+<file path=ppt/slides/slide17.xml><?xml version="1.0" encoding="utf-8"?>
 <p:sld xmlns:a="http://schemas.openxmlformats.org/drawingml/2006/main" xmlns:r="http://schemas.openxmlformats.org/officeDocument/2006/relationships" xmlns:p="http://schemas.openxmlformats.org/presentationml/2006/main">
   <p:cSld>
     <p:spTree>
@@ -4815,11 +6231,7 @@
           <a:p>
             <a:r>
               <a:rPr lang="en-CA" dirty="0" smtClean="0"/>
-              <a:t>HPA</a:t>
-            </a:r>
-            <a:r>
-              <a:rPr lang="en-CA" dirty="0" smtClean="0"/>
-              <a:t>* </a:t>
+              <a:t>HPA* </a:t>
             </a:r>
             <a:r>
               <a:rPr lang="en-CA" dirty="0" err="1" smtClean="0"/>
@@ -4937,11 +6349,7 @@
             </a:r>
             <a:r>
               <a:rPr lang="en-CA" dirty="0" smtClean="0"/>
-              <a:t> </a:t>
-            </a:r>
-            <a:r>
-              <a:rPr lang="en-CA" dirty="0" smtClean="0"/>
-              <a:t>pour la </a:t>
+              <a:t> pour la </a:t>
             </a:r>
             <a:r>
               <a:rPr lang="en-CA" dirty="0" err="1" smtClean="0"/>
@@ -5530,7 +6938,6 @@
               <a:rPr lang="en-CA" dirty="0" smtClean="0"/>
               <a:t>Analyse</a:t>
             </a:r>
-            <a:endParaRPr lang="en-CA" dirty="0" smtClean="0"/>
           </a:p>
           <a:p>
             <a:pPr lvl="1"/>

</xml_diff>